<commit_message>
More updated sponsor logos
Signed-off-by: Nathen Harvey <nharvey@chef.io>
</commit_message>
<xml_diff>
--- a/2016-slides/sponsor_pitches.pptx
+++ b/2016-slides/sponsor_pitches.pptx
@@ -244,7 +244,7 @@
           <a:p>
             <a:fld id="{246436A6-C362-A54E-9CAE-CE86B8EFD4DC}" type="datetimeFigureOut">
               <a:rPr lang="en-US" smtClean="0"/>
-              <a:t>6/1/16</a:t>
+              <a:t>6/2/16</a:t>
             </a:fld>
             <a:endParaRPr lang="en-US"/>
           </a:p>
@@ -785,7 +785,7 @@
           <a:p>
             <a:fld id="{CFE0B1BC-282E-8A47-A5B9-1DC3ABD76C4D}" type="datetimeFigureOut">
               <a:rPr lang="en-US" smtClean="0"/>
-              <a:t>6/1/16</a:t>
+              <a:t>6/2/16</a:t>
             </a:fld>
             <a:endParaRPr lang="en-US"/>
           </a:p>
@@ -985,7 +985,7 @@
           <a:p>
             <a:fld id="{CFE0B1BC-282E-8A47-A5B9-1DC3ABD76C4D}" type="datetimeFigureOut">
               <a:rPr lang="en-US" smtClean="0"/>
-              <a:t>6/1/16</a:t>
+              <a:t>6/2/16</a:t>
             </a:fld>
             <a:endParaRPr lang="en-US"/>
           </a:p>
@@ -1195,7 +1195,7 @@
           <a:p>
             <a:fld id="{CFE0B1BC-282E-8A47-A5B9-1DC3ABD76C4D}" type="datetimeFigureOut">
               <a:rPr lang="en-US" smtClean="0"/>
-              <a:t>6/1/16</a:t>
+              <a:t>6/2/16</a:t>
             </a:fld>
             <a:endParaRPr lang="en-US"/>
           </a:p>
@@ -1343,7 +1343,7 @@
           <a:p>
             <a:fld id="{CFE0B1BC-282E-8A47-A5B9-1DC3ABD76C4D}" type="datetimeFigureOut">
               <a:rPr lang="en-US" smtClean="0"/>
-              <a:t>6/1/16</a:t>
+              <a:t>6/2/16</a:t>
             </a:fld>
             <a:endParaRPr lang="en-US"/>
           </a:p>
@@ -1544,7 +1544,7 @@
           <a:p>
             <a:fld id="{CFE0B1BC-282E-8A47-A5B9-1DC3ABD76C4D}" type="datetimeFigureOut">
               <a:rPr lang="en-US" smtClean="0"/>
-              <a:t>6/1/16</a:t>
+              <a:t>6/2/16</a:t>
             </a:fld>
             <a:endParaRPr lang="en-US"/>
           </a:p>
@@ -1820,7 +1820,7 @@
           <a:p>
             <a:fld id="{CFE0B1BC-282E-8A47-A5B9-1DC3ABD76C4D}" type="datetimeFigureOut">
               <a:rPr lang="en-US" smtClean="0"/>
-              <a:t>6/1/16</a:t>
+              <a:t>6/2/16</a:t>
             </a:fld>
             <a:endParaRPr lang="en-US"/>
           </a:p>
@@ -2138,7 +2138,7 @@
           <a:p>
             <a:fld id="{CFE0B1BC-282E-8A47-A5B9-1DC3ABD76C4D}" type="datetimeFigureOut">
               <a:rPr lang="en-US" smtClean="0"/>
-              <a:t>6/1/16</a:t>
+              <a:t>6/2/16</a:t>
             </a:fld>
             <a:endParaRPr lang="en-US"/>
           </a:p>
@@ -2590,7 +2590,7 @@
           <a:p>
             <a:fld id="{CFE0B1BC-282E-8A47-A5B9-1DC3ABD76C4D}" type="datetimeFigureOut">
               <a:rPr lang="en-US" smtClean="0"/>
-              <a:t>6/1/16</a:t>
+              <a:t>6/2/16</a:t>
             </a:fld>
             <a:endParaRPr lang="en-US"/>
           </a:p>
@@ -2738,7 +2738,7 @@
           <a:p>
             <a:fld id="{CFE0B1BC-282E-8A47-A5B9-1DC3ABD76C4D}" type="datetimeFigureOut">
               <a:rPr lang="en-US" smtClean="0"/>
-              <a:t>6/1/16</a:t>
+              <a:t>6/2/16</a:t>
             </a:fld>
             <a:endParaRPr lang="en-US"/>
           </a:p>
@@ -2863,7 +2863,7 @@
           <a:p>
             <a:fld id="{CFE0B1BC-282E-8A47-A5B9-1DC3ABD76C4D}" type="datetimeFigureOut">
               <a:rPr lang="en-US" smtClean="0"/>
-              <a:t>6/1/16</a:t>
+              <a:t>6/2/16</a:t>
             </a:fld>
             <a:endParaRPr lang="en-US"/>
           </a:p>
@@ -3170,7 +3170,7 @@
           <a:p>
             <a:fld id="{CFE0B1BC-282E-8A47-A5B9-1DC3ABD76C4D}" type="datetimeFigureOut">
               <a:rPr lang="en-US" smtClean="0"/>
-              <a:t>6/1/16</a:t>
+              <a:t>6/2/16</a:t>
             </a:fld>
             <a:endParaRPr lang="en-US"/>
           </a:p>
@@ -3453,7 +3453,7 @@
           <a:p>
             <a:fld id="{CFE0B1BC-282E-8A47-A5B9-1DC3ABD76C4D}" type="datetimeFigureOut">
               <a:rPr lang="en-US" smtClean="0"/>
-              <a:t>6/1/16</a:t>
+              <a:t>6/2/16</a:t>
             </a:fld>
             <a:endParaRPr lang="en-US"/>
           </a:p>
@@ -3696,7 +3696,7 @@
           <a:p>
             <a:fld id="{CFE0B1BC-282E-8A47-A5B9-1DC3ABD76C4D}" type="datetimeFigureOut">
               <a:rPr lang="en-US" smtClean="0"/>
-              <a:t>6/1/16</a:t>
+              <a:t>6/2/16</a:t>
             </a:fld>
             <a:endParaRPr lang="en-US"/>
           </a:p>
@@ -4478,11 +4478,11 @@
   <p:clrMapOvr>
     <a:masterClrMapping/>
   </p:clrMapOvr>
-  <mc:AlternateContent xmlns:mc="http://schemas.openxmlformats.org/markup-compatibility/2006">
-    <mc:Choice xmlns:p14="http://schemas.microsoft.com/office/powerpoint/2010/main" Requires="p14">
+  <mc:AlternateContent xmlns:mc="http://schemas.openxmlformats.org/markup-compatibility/2006" xmlns:p14="http://schemas.microsoft.com/office/powerpoint/2010/main">
+    <mc:Choice Requires="p14">
       <p:transition spd="slow" p14:dur="2000" advClick="0" advTm="63000"/>
     </mc:Choice>
-    <mc:Fallback>
+    <mc:Fallback xmlns="">
       <p:transition xmlns:p14="http://schemas.microsoft.com/office/powerpoint/2010/main" spd="slow" advClick="0" advTm="63000"/>
     </mc:Fallback>
   </mc:AlternateContent>
@@ -4838,11 +4838,11 @@
   <p:clrMapOvr>
     <a:masterClrMapping/>
   </p:clrMapOvr>
-  <mc:AlternateContent xmlns:mc="http://schemas.openxmlformats.org/markup-compatibility/2006">
-    <mc:Choice xmlns:p14="http://schemas.microsoft.com/office/powerpoint/2010/main" Requires="p14">
+  <mc:AlternateContent xmlns:mc="http://schemas.openxmlformats.org/markup-compatibility/2006" xmlns:p14="http://schemas.microsoft.com/office/powerpoint/2010/main">
+    <mc:Choice Requires="p14">
       <p:transition spd="slow" p14:dur="2000" advClick="0" advTm="63000"/>
     </mc:Choice>
-    <mc:Fallback>
+    <mc:Fallback xmlns="">
       <p:transition xmlns:p14="http://schemas.microsoft.com/office/powerpoint/2010/main" spd="slow" advClick="0" advTm="63000"/>
     </mc:Fallback>
   </mc:AlternateContent>
@@ -5399,11 +5399,11 @@
   <p:clrMapOvr>
     <a:masterClrMapping/>
   </p:clrMapOvr>
-  <mc:AlternateContent xmlns:mc="http://schemas.openxmlformats.org/markup-compatibility/2006">
-    <mc:Choice xmlns:p14="http://schemas.microsoft.com/office/powerpoint/2010/main" Requires="p14">
+  <mc:AlternateContent xmlns:mc="http://schemas.openxmlformats.org/markup-compatibility/2006" xmlns:p14="http://schemas.microsoft.com/office/powerpoint/2010/main">
+    <mc:Choice Requires="p14">
       <p:transition spd="slow" p14:dur="2000" advClick="0" advTm="63000"/>
     </mc:Choice>
-    <mc:Fallback>
+    <mc:Fallback xmlns="">
       <p:transition xmlns:p14="http://schemas.microsoft.com/office/powerpoint/2010/main" spd="slow" advClick="0" advTm="63000"/>
     </mc:Fallback>
   </mc:AlternateContent>
@@ -5754,11 +5754,11 @@
   <p:clrMapOvr>
     <a:masterClrMapping/>
   </p:clrMapOvr>
-  <mc:AlternateContent xmlns:mc="http://schemas.openxmlformats.org/markup-compatibility/2006">
-    <mc:Choice xmlns:p14="http://schemas.microsoft.com/office/powerpoint/2010/main" Requires="p14">
+  <mc:AlternateContent xmlns:mc="http://schemas.openxmlformats.org/markup-compatibility/2006" xmlns:p14="http://schemas.microsoft.com/office/powerpoint/2010/main">
+    <mc:Choice Requires="p14">
       <p:transition spd="slow" p14:dur="2000" advClick="0" advTm="63000"/>
     </mc:Choice>
-    <mc:Fallback>
+    <mc:Fallback xmlns="">
       <p:transition xmlns:p14="http://schemas.microsoft.com/office/powerpoint/2010/main" spd="slow" advClick="0" advTm="63000"/>
     </mc:Fallback>
   </mc:AlternateContent>
@@ -6171,11 +6171,11 @@
   <p:clrMapOvr>
     <a:masterClrMapping/>
   </p:clrMapOvr>
-  <mc:AlternateContent xmlns:mc="http://schemas.openxmlformats.org/markup-compatibility/2006">
-    <mc:Choice xmlns:p14="http://schemas.microsoft.com/office/powerpoint/2010/main" Requires="p14">
+  <mc:AlternateContent xmlns:mc="http://schemas.openxmlformats.org/markup-compatibility/2006" xmlns:p14="http://schemas.microsoft.com/office/powerpoint/2010/main">
+    <mc:Choice Requires="p14">
       <p:transition spd="slow" p14:dur="2000" advClick="0" advTm="63000"/>
     </mc:Choice>
-    <mc:Fallback>
+    <mc:Fallback xmlns="">
       <p:transition xmlns:p14="http://schemas.microsoft.com/office/powerpoint/2010/main" spd="slow" advClick="0" advTm="63000"/>
     </mc:Fallback>
   </mc:AlternateContent>
@@ -6526,11 +6526,11 @@
   <p:clrMapOvr>
     <a:masterClrMapping/>
   </p:clrMapOvr>
-  <mc:AlternateContent xmlns:mc="http://schemas.openxmlformats.org/markup-compatibility/2006">
-    <mc:Choice xmlns:p14="http://schemas.microsoft.com/office/powerpoint/2010/main" Requires="p14">
+  <mc:AlternateContent xmlns:mc="http://schemas.openxmlformats.org/markup-compatibility/2006" xmlns:p14="http://schemas.microsoft.com/office/powerpoint/2010/main">
+    <mc:Choice Requires="p14">
       <p:transition spd="slow" p14:dur="2000" advClick="0" advTm="63000"/>
     </mc:Choice>
-    <mc:Fallback>
+    <mc:Fallback xmlns="">
       <p:transition xmlns:p14="http://schemas.microsoft.com/office/powerpoint/2010/main" spd="slow" advClick="0" advTm="63000"/>
     </mc:Fallback>
   </mc:AlternateContent>
@@ -6912,11 +6912,11 @@
   <p:clrMapOvr>
     <a:masterClrMapping/>
   </p:clrMapOvr>
-  <mc:AlternateContent xmlns:mc="http://schemas.openxmlformats.org/markup-compatibility/2006">
-    <mc:Choice xmlns:p14="http://schemas.microsoft.com/office/powerpoint/2010/main" Requires="p14">
+  <mc:AlternateContent xmlns:mc="http://schemas.openxmlformats.org/markup-compatibility/2006" xmlns:p14="http://schemas.microsoft.com/office/powerpoint/2010/main">
+    <mc:Choice Requires="p14">
       <p:transition spd="slow" p14:dur="2000" advClick="0" advTm="63000"/>
     </mc:Choice>
-    <mc:Fallback>
+    <mc:Fallback xmlns="">
       <p:transition xmlns:p14="http://schemas.microsoft.com/office/powerpoint/2010/main" spd="slow" advClick="0" advTm="63000"/>
     </mc:Fallback>
   </mc:AlternateContent>
@@ -7243,7 +7243,7 @@
             </a:r>
             <a:r>
               <a:rPr lang="en-US" dirty="0" err="1" smtClean="0"/>
-              <a:t>aol</a:t>
+              <a:t>aol_inc</a:t>
             </a:r>
             <a:endParaRPr lang="en-US" dirty="0"/>
           </a:p>
@@ -7259,11 +7259,11 @@
   <p:clrMapOvr>
     <a:masterClrMapping/>
   </p:clrMapOvr>
-  <mc:AlternateContent xmlns:mc="http://schemas.openxmlformats.org/markup-compatibility/2006">
-    <mc:Choice xmlns:p14="http://schemas.microsoft.com/office/powerpoint/2010/main" Requires="p14">
+  <mc:AlternateContent xmlns:mc="http://schemas.openxmlformats.org/markup-compatibility/2006" xmlns:p14="http://schemas.microsoft.com/office/powerpoint/2010/main">
+    <mc:Choice Requires="p14">
       <p:transition spd="slow" p14:dur="2000" advClick="0" advTm="63000"/>
     </mc:Choice>
-    <mc:Fallback>
+    <mc:Fallback xmlns="">
       <p:transition xmlns:p14="http://schemas.microsoft.com/office/powerpoint/2010/main" spd="slow" advClick="0" advTm="63000"/>
     </mc:Fallback>
   </mc:AlternateContent>
@@ -7701,11 +7701,11 @@
   <p:clrMapOvr>
     <a:masterClrMapping/>
   </p:clrMapOvr>
-  <mc:AlternateContent xmlns:mc="http://schemas.openxmlformats.org/markup-compatibility/2006">
-    <mc:Choice xmlns:p14="http://schemas.microsoft.com/office/powerpoint/2010/main" Requires="p14">
+  <mc:AlternateContent xmlns:mc="http://schemas.openxmlformats.org/markup-compatibility/2006" xmlns:p14="http://schemas.microsoft.com/office/powerpoint/2010/main">
+    <mc:Choice Requires="p14">
       <p:transition spd="slow" p14:dur="2000" advClick="0" advTm="63000"/>
     </mc:Choice>
-    <mc:Fallback>
+    <mc:Fallback xmlns="">
       <p:transition xmlns:p14="http://schemas.microsoft.com/office/powerpoint/2010/main" spd="slow" advClick="0" advTm="63000"/>
     </mc:Fallback>
   </mc:AlternateContent>
@@ -8028,11 +8028,11 @@
   <p:clrMapOvr>
     <a:masterClrMapping/>
   </p:clrMapOvr>
-  <mc:AlternateContent xmlns:mc="http://schemas.openxmlformats.org/markup-compatibility/2006">
-    <mc:Choice xmlns:p14="http://schemas.microsoft.com/office/powerpoint/2010/main" Requires="p14">
+  <mc:AlternateContent xmlns:mc="http://schemas.openxmlformats.org/markup-compatibility/2006" xmlns:p14="http://schemas.microsoft.com/office/powerpoint/2010/main">
+    <mc:Choice Requires="p14">
       <p:transition spd="slow" p14:dur="2000" advClick="0" advTm="63000"/>
     </mc:Choice>
-    <mc:Fallback>
+    <mc:Fallback xmlns="">
       <p:transition xmlns:p14="http://schemas.microsoft.com/office/powerpoint/2010/main" spd="slow" advClick="0" advTm="63000"/>
     </mc:Fallback>
   </mc:AlternateContent>
@@ -8429,11 +8429,11 @@
   <p:clrMapOvr>
     <a:masterClrMapping/>
   </p:clrMapOvr>
-  <mc:AlternateContent xmlns:mc="http://schemas.openxmlformats.org/markup-compatibility/2006">
-    <mc:Choice xmlns:p14="http://schemas.microsoft.com/office/powerpoint/2010/main" Requires="p14">
+  <mc:AlternateContent xmlns:mc="http://schemas.openxmlformats.org/markup-compatibility/2006" xmlns:p14="http://schemas.microsoft.com/office/powerpoint/2010/main">
+    <mc:Choice Requires="p14">
       <p:transition spd="slow" p14:dur="2000" advClick="0" advTm="63000"/>
     </mc:Choice>
-    <mc:Fallback>
+    <mc:Fallback xmlns="">
       <p:transition xmlns:p14="http://schemas.microsoft.com/office/powerpoint/2010/main" spd="slow" advClick="0" advTm="63000"/>
     </mc:Fallback>
   </mc:AlternateContent>
@@ -8784,11 +8784,11 @@
   <p:clrMapOvr>
     <a:masterClrMapping/>
   </p:clrMapOvr>
-  <mc:AlternateContent xmlns:mc="http://schemas.openxmlformats.org/markup-compatibility/2006">
-    <mc:Choice xmlns:p14="http://schemas.microsoft.com/office/powerpoint/2010/main" Requires="p14">
+  <mc:AlternateContent xmlns:mc="http://schemas.openxmlformats.org/markup-compatibility/2006" xmlns:p14="http://schemas.microsoft.com/office/powerpoint/2010/main">
+    <mc:Choice Requires="p14">
       <p:transition spd="slow" p14:dur="2000" advClick="0" advTm="63000"/>
     </mc:Choice>
-    <mc:Fallback>
+    <mc:Fallback xmlns="">
       <p:transition xmlns:p14="http://schemas.microsoft.com/office/powerpoint/2010/main" spd="slow" advClick="0" advTm="63000"/>
     </mc:Fallback>
   </mc:AlternateContent>
@@ -9197,11 +9197,11 @@
   <p:clrMapOvr>
     <a:masterClrMapping/>
   </p:clrMapOvr>
-  <mc:AlternateContent xmlns:mc="http://schemas.openxmlformats.org/markup-compatibility/2006">
-    <mc:Choice xmlns:p14="http://schemas.microsoft.com/office/powerpoint/2010/main" Requires="p14">
+  <mc:AlternateContent xmlns:mc="http://schemas.openxmlformats.org/markup-compatibility/2006" xmlns:p14="http://schemas.microsoft.com/office/powerpoint/2010/main">
+    <mc:Choice Requires="p14">
       <p:transition spd="slow" p14:dur="2000" advClick="0" advTm="63000"/>
     </mc:Choice>
-    <mc:Fallback>
+    <mc:Fallback xmlns="">
       <p:transition xmlns:p14="http://schemas.microsoft.com/office/powerpoint/2010/main" spd="slow" advClick="0" advTm="63000"/>
     </mc:Fallback>
   </mc:AlternateContent>
@@ -9598,11 +9598,11 @@
   <p:clrMapOvr>
     <a:masterClrMapping/>
   </p:clrMapOvr>
-  <mc:AlternateContent xmlns:mc="http://schemas.openxmlformats.org/markup-compatibility/2006">
-    <mc:Choice xmlns:p14="http://schemas.microsoft.com/office/powerpoint/2010/main" Requires="p14">
+  <mc:AlternateContent xmlns:mc="http://schemas.openxmlformats.org/markup-compatibility/2006" xmlns:p14="http://schemas.microsoft.com/office/powerpoint/2010/main">
+    <mc:Choice Requires="p14">
       <p:transition spd="slow" p14:dur="2000" advClick="0" advTm="63000"/>
     </mc:Choice>
-    <mc:Fallback>
+    <mc:Fallback xmlns="">
       <p:transition xmlns:p14="http://schemas.microsoft.com/office/powerpoint/2010/main" spd="slow" advClick="0" advTm="63000"/>
     </mc:Fallback>
   </mc:AlternateContent>
@@ -10241,11 +10241,11 @@
   <p:clrMapOvr>
     <a:masterClrMapping/>
   </p:clrMapOvr>
-  <mc:AlternateContent xmlns:mc="http://schemas.openxmlformats.org/markup-compatibility/2006">
-    <mc:Choice xmlns:p14="http://schemas.microsoft.com/office/powerpoint/2010/main" Requires="p14">
+  <mc:AlternateContent xmlns:mc="http://schemas.openxmlformats.org/markup-compatibility/2006" xmlns:p14="http://schemas.microsoft.com/office/powerpoint/2010/main">
+    <mc:Choice Requires="p14">
       <p:transition spd="slow" p14:dur="2000" advClick="0" advTm="63000"/>
     </mc:Choice>
-    <mc:Fallback>
+    <mc:Fallback xmlns="">
       <p:transition xmlns:p14="http://schemas.microsoft.com/office/powerpoint/2010/main" spd="slow" advClick="0" advTm="63000"/>
     </mc:Fallback>
   </mc:AlternateContent>
@@ -10596,11 +10596,11 @@
   <p:clrMapOvr>
     <a:masterClrMapping/>
   </p:clrMapOvr>
-  <mc:AlternateContent xmlns:mc="http://schemas.openxmlformats.org/markup-compatibility/2006">
-    <mc:Choice xmlns:p14="http://schemas.microsoft.com/office/powerpoint/2010/main" Requires="p14">
+  <mc:AlternateContent xmlns:mc="http://schemas.openxmlformats.org/markup-compatibility/2006" xmlns:p14="http://schemas.microsoft.com/office/powerpoint/2010/main">
+    <mc:Choice Requires="p14">
       <p:transition spd="slow" p14:dur="2000" advClick="0" advTm="63000"/>
     </mc:Choice>
-    <mc:Fallback>
+    <mc:Fallback xmlns="">
       <p:transition xmlns:p14="http://schemas.microsoft.com/office/powerpoint/2010/main" spd="slow" advClick="0" advTm="63000"/>
     </mc:Fallback>
   </mc:AlternateContent>
@@ -10951,11 +10951,11 @@
   <p:clrMapOvr>
     <a:masterClrMapping/>
   </p:clrMapOvr>
-  <mc:AlternateContent xmlns:mc="http://schemas.openxmlformats.org/markup-compatibility/2006">
-    <mc:Choice xmlns:p14="http://schemas.microsoft.com/office/powerpoint/2010/main" Requires="p14">
+  <mc:AlternateContent xmlns:mc="http://schemas.openxmlformats.org/markup-compatibility/2006" xmlns:p14="http://schemas.microsoft.com/office/powerpoint/2010/main">
+    <mc:Choice Requires="p14">
       <p:transition spd="slow" p14:dur="2000" advClick="0" advTm="63000"/>
     </mc:Choice>
-    <mc:Fallback>
+    <mc:Fallback xmlns="">
       <p:transition xmlns:p14="http://schemas.microsoft.com/office/powerpoint/2010/main" spd="slow" advClick="0" advTm="63000"/>
     </mc:Fallback>
   </mc:AlternateContent>
@@ -11306,11 +11306,11 @@
   <p:clrMapOvr>
     <a:masterClrMapping/>
   </p:clrMapOvr>
-  <mc:AlternateContent xmlns:mc="http://schemas.openxmlformats.org/markup-compatibility/2006">
-    <mc:Choice xmlns:p14="http://schemas.microsoft.com/office/powerpoint/2010/main" Requires="p14">
+  <mc:AlternateContent xmlns:mc="http://schemas.openxmlformats.org/markup-compatibility/2006" xmlns:p14="http://schemas.microsoft.com/office/powerpoint/2010/main">
+    <mc:Choice Requires="p14">
       <p:transition spd="slow" p14:dur="2000" advClick="0" advTm="63000"/>
     </mc:Choice>
-    <mc:Fallback>
+    <mc:Fallback xmlns="">
       <p:transition xmlns:p14="http://schemas.microsoft.com/office/powerpoint/2010/main" spd="slow" advClick="0" advTm="63000"/>
     </mc:Fallback>
   </mc:AlternateContent>
@@ -11571,11 +11571,11 @@
   <p:clrMapOvr>
     <a:masterClrMapping/>
   </p:clrMapOvr>
-  <mc:AlternateContent xmlns:mc="http://schemas.openxmlformats.org/markup-compatibility/2006">
-    <mc:Choice xmlns:p14="http://schemas.microsoft.com/office/powerpoint/2010/main" Requires="p14">
+  <mc:AlternateContent xmlns:mc="http://schemas.openxmlformats.org/markup-compatibility/2006" xmlns:p14="http://schemas.microsoft.com/office/powerpoint/2010/main">
+    <mc:Choice Requires="p14">
       <p:transition spd="slow" p14:dur="2000" advClick="0" advTm="63000"/>
     </mc:Choice>
-    <mc:Fallback>
+    <mc:Fallback xmlns="">
       <p:transition xmlns:p14="http://schemas.microsoft.com/office/powerpoint/2010/main" spd="slow" advClick="0" advTm="63000"/>
     </mc:Fallback>
   </mc:AlternateContent>
@@ -11926,11 +11926,11 @@
   <p:clrMapOvr>
     <a:masterClrMapping/>
   </p:clrMapOvr>
-  <mc:AlternateContent xmlns:mc="http://schemas.openxmlformats.org/markup-compatibility/2006">
-    <mc:Choice xmlns:p14="http://schemas.microsoft.com/office/powerpoint/2010/main" Requires="p14">
+  <mc:AlternateContent xmlns:mc="http://schemas.openxmlformats.org/markup-compatibility/2006" xmlns:p14="http://schemas.microsoft.com/office/powerpoint/2010/main">
+    <mc:Choice Requires="p14">
       <p:transition spd="slow" p14:dur="2000" advClick="0" advTm="63000"/>
     </mc:Choice>
-    <mc:Fallback>
+    <mc:Fallback xmlns="">
       <p:transition xmlns:p14="http://schemas.microsoft.com/office/powerpoint/2010/main" spd="slow" advClick="0" advTm="63000"/>
     </mc:Fallback>
   </mc:AlternateContent>
@@ -12492,11 +12492,11 @@
   <p:clrMapOvr>
     <a:masterClrMapping/>
   </p:clrMapOvr>
-  <mc:AlternateContent xmlns:mc="http://schemas.openxmlformats.org/markup-compatibility/2006">
-    <mc:Choice xmlns:p14="http://schemas.microsoft.com/office/powerpoint/2010/main" Requires="p14">
+  <mc:AlternateContent xmlns:mc="http://schemas.openxmlformats.org/markup-compatibility/2006" xmlns:p14="http://schemas.microsoft.com/office/powerpoint/2010/main">
+    <mc:Choice Requires="p14">
       <p:transition spd="slow" p14:dur="2000" advClick="0" advTm="63000"/>
     </mc:Choice>
-    <mc:Fallback>
+    <mc:Fallback xmlns="">
       <p:transition xmlns:p14="http://schemas.microsoft.com/office/powerpoint/2010/main" spd="slow" advClick="0" advTm="63000"/>
     </mc:Fallback>
   </mc:AlternateContent>
@@ -12847,11 +12847,11 @@
   <p:clrMapOvr>
     <a:masterClrMapping/>
   </p:clrMapOvr>
-  <mc:AlternateContent xmlns:mc="http://schemas.openxmlformats.org/markup-compatibility/2006">
-    <mc:Choice xmlns:p14="http://schemas.microsoft.com/office/powerpoint/2010/main" Requires="p14">
+  <mc:AlternateContent xmlns:mc="http://schemas.openxmlformats.org/markup-compatibility/2006" xmlns:p14="http://schemas.microsoft.com/office/powerpoint/2010/main">
+    <mc:Choice Requires="p14">
       <p:transition spd="slow" p14:dur="2000" advClick="0" advTm="63000"/>
     </mc:Choice>
-    <mc:Fallback>
+    <mc:Fallback xmlns="">
       <p:transition xmlns:p14="http://schemas.microsoft.com/office/powerpoint/2010/main" spd="slow" advClick="0" advTm="63000"/>
     </mc:Fallback>
   </mc:AlternateContent>

</xml_diff>